<commit_message>
update PPT for demo
</commit_message>
<xml_diff>
--- a/finalReport/RUCMChecker_final_report.pptx
+++ b/finalReport/RUCMChecker_final_report.pptx
@@ -5,7 +5,7 @@
     <p:sldMasterId id="2147483660" r:id="rId1"/>
   </p:sldMasterIdLst>
   <p:notesMasterIdLst>
-    <p:notesMasterId r:id="rId56"/>
+    <p:notesMasterId r:id="rId55"/>
   </p:notesMasterIdLst>
   <p:sldIdLst>
     <p:sldId id="256" r:id="rId2"/>
@@ -53,15 +53,14 @@
     <p:sldId id="691" r:id="rId44"/>
     <p:sldId id="670" r:id="rId45"/>
     <p:sldId id="695" r:id="rId46"/>
-    <p:sldId id="697" r:id="rId47"/>
-    <p:sldId id="698" r:id="rId48"/>
-    <p:sldId id="681" r:id="rId49"/>
-    <p:sldId id="683" r:id="rId50"/>
-    <p:sldId id="701" r:id="rId51"/>
-    <p:sldId id="702" r:id="rId52"/>
-    <p:sldId id="703" r:id="rId53"/>
-    <p:sldId id="332" r:id="rId54"/>
-    <p:sldId id="649" r:id="rId55"/>
+    <p:sldId id="698" r:id="rId47"/>
+    <p:sldId id="681" r:id="rId48"/>
+    <p:sldId id="683" r:id="rId49"/>
+    <p:sldId id="702" r:id="rId50"/>
+    <p:sldId id="703" r:id="rId51"/>
+    <p:sldId id="332" r:id="rId52"/>
+    <p:sldId id="712" r:id="rId53"/>
+    <p:sldId id="649" r:id="rId54"/>
   </p:sldIdLst>
   <p:sldSz cx="9144000" cy="6858000" type="screen4x3"/>
   <p:notesSz cx="6858000" cy="9144000"/>
@@ -201,7 +200,7 @@
 <file path=ppt/charts/chart1.xml><?xml version="1.0" encoding="utf-8"?>
 <c:chartSpace xmlns:c="http://schemas.openxmlformats.org/drawingml/2006/chart" xmlns:a="http://schemas.openxmlformats.org/drawingml/2006/main" xmlns:r="http://schemas.openxmlformats.org/officeDocument/2006/relationships" xmlns:c16r2="http://schemas.microsoft.com/office/drawing/2015/06/chart">
   <c:date1904 val="0"/>
-  <c:lang val="en-US"/>
+  <c:lang val="zh-CN"/>
   <c:roundedCorners val="0"/>
   <mc:AlternateContent xmlns:mc="http://schemas.openxmlformats.org/markup-compatibility/2006">
     <mc:Choice xmlns:c14="http://schemas.microsoft.com/office/drawing/2007/8/2/chart" Requires="c14">
@@ -278,7 +277,7 @@
               <a:cs typeface="+mn-cs"/>
             </a:defRPr>
           </a:pPr>
-          <a:endParaRPr lang="en-US"/>
+          <a:endParaRPr lang="zh-CN"/>
         </a:p>
       </c:txPr>
     </c:title>
@@ -636,7 +635,7 @@
                 <a:cs typeface="+mn-cs"/>
               </a:defRPr>
             </a:pPr>
-            <a:endParaRPr lang="en-US"/>
+            <a:endParaRPr lang="zh-CN"/>
           </a:p>
         </c:txPr>
         <c:crossAx val="462948888"/>
@@ -695,7 +694,7 @@
                 <a:cs typeface="+mn-cs"/>
               </a:defRPr>
             </a:pPr>
-            <a:endParaRPr lang="en-US"/>
+            <a:endParaRPr lang="zh-CN"/>
           </a:p>
         </c:txPr>
         <c:crossAx val="462947576"/>
@@ -737,7 +736,7 @@
               <a:cs typeface="+mn-cs"/>
             </a:defRPr>
           </a:pPr>
-          <a:endParaRPr lang="en-US"/>
+          <a:endParaRPr lang="zh-CN"/>
         </a:p>
       </c:txPr>
     </c:legend>
@@ -766,7 +765,7 @@
       <a:pPr>
         <a:defRPr/>
       </a:pPr>
-      <a:endParaRPr lang="en-US"/>
+      <a:endParaRPr lang="zh-CN"/>
     </a:p>
   </c:txPr>
   <c:externalData r:id="rId3">
@@ -778,7 +777,7 @@
 <file path=ppt/charts/chart2.xml><?xml version="1.0" encoding="utf-8"?>
 <c:chartSpace xmlns:c="http://schemas.openxmlformats.org/drawingml/2006/chart" xmlns:a="http://schemas.openxmlformats.org/drawingml/2006/main" xmlns:r="http://schemas.openxmlformats.org/officeDocument/2006/relationships" xmlns:c16r2="http://schemas.microsoft.com/office/drawing/2015/06/chart">
   <c:date1904 val="0"/>
-  <c:lang val="en-US"/>
+  <c:lang val="zh-CN"/>
   <c:roundedCorners val="0"/>
   <mc:AlternateContent xmlns:mc="http://schemas.openxmlformats.org/markup-compatibility/2006">
     <mc:Choice xmlns:c14="http://schemas.microsoft.com/office/drawing/2007/8/2/chart" Requires="c14">
@@ -815,7 +814,7 @@
               <a:cs typeface="+mn-cs"/>
             </a:defRPr>
           </a:pPr>
-          <a:endParaRPr lang="en-US"/>
+          <a:endParaRPr lang="zh-CN"/>
         </a:p>
       </c:txPr>
     </c:title>
@@ -1011,7 +1010,7 @@
               <a:cs typeface="+mn-cs"/>
             </a:defRPr>
           </a:pPr>
-          <a:endParaRPr lang="en-US"/>
+          <a:endParaRPr lang="zh-CN"/>
         </a:p>
       </c:txPr>
     </c:legend>
@@ -1040,7 +1039,7 @@
       <a:pPr>
         <a:defRPr/>
       </a:pPr>
-      <a:endParaRPr lang="en-US"/>
+      <a:endParaRPr lang="zh-CN"/>
     </a:p>
   </c:txPr>
   <c:externalData r:id="rId3">
@@ -4939,7 +4938,7 @@
               <a:pPr>
                 <a:defRPr/>
               </a:pPr>
-              <a:t>1/2/19</a:t>
+              <a:t>1/3/2019</a:t>
             </a:fld>
             <a:endParaRPr lang="en-US"/>
           </a:p>
@@ -8381,7 +8380,7 @@
     </p:spTree>
     <p:extLst>
       <p:ext uri="{BB962C8B-B14F-4D97-AF65-F5344CB8AC3E}">
-        <p14:creationId xmlns:p14="http://schemas.microsoft.com/office/powerpoint/2010/main" val="2371731440"/>
+        <p14:creationId xmlns:p14="http://schemas.microsoft.com/office/powerpoint/2010/main" val="327987258"/>
       </p:ext>
     </p:extLst>
   </p:cSld>
@@ -8452,6 +8451,18 @@
               <a:tabLst/>
               <a:defRPr/>
             </a:pPr>
+            <a:r>
+              <a:rPr lang="zh-CN" altLang="en-US" sz="1200" kern="1200" dirty="0">
+                <a:solidFill>
+                  <a:schemeClr val="tx1"/>
+                </a:solidFill>
+                <a:effectLst/>
+                <a:latin typeface="+mn-lt"/>
+                <a:ea typeface="+mn-ea"/>
+                <a:cs typeface="+mn-cs"/>
+              </a:rPr>
+              <a:t>团队协作能力、吵架能力的提升</a:t>
+            </a:r>
             <a:endParaRPr lang="zh-CN" altLang="zh-CN" sz="1200" kern="1200" dirty="0">
               <a:solidFill>
                 <a:schemeClr val="tx1"/>
@@ -8487,7 +8498,7 @@
               <a:pPr>
                 <a:defRPr/>
               </a:pPr>
-              <a:t>47</a:t>
+              <a:t>48</a:t>
             </a:fld>
             <a:endParaRPr lang="en-US"/>
           </a:p>
@@ -8496,7 +8507,7 @@
     </p:spTree>
     <p:extLst>
       <p:ext uri="{BB962C8B-B14F-4D97-AF65-F5344CB8AC3E}">
-        <p14:creationId xmlns:p14="http://schemas.microsoft.com/office/powerpoint/2010/main" val="327987258"/>
+        <p14:creationId xmlns:p14="http://schemas.microsoft.com/office/powerpoint/2010/main" val="2138529283"/>
       </p:ext>
     </p:extLst>
   </p:cSld>
@@ -8623,7 +8634,7 @@
     </p:spTree>
     <p:extLst>
       <p:ext uri="{BB962C8B-B14F-4D97-AF65-F5344CB8AC3E}">
-        <p14:creationId xmlns:p14="http://schemas.microsoft.com/office/powerpoint/2010/main" val="2138529283"/>
+        <p14:creationId xmlns:p14="http://schemas.microsoft.com/office/powerpoint/2010/main" val="644760793"/>
       </p:ext>
     </p:extLst>
   </p:cSld>
@@ -8742,260 +8753,6 @@
                 <a:defRPr/>
               </a:pPr>
               <a:t>50</a:t>
-            </a:fld>
-            <a:endParaRPr lang="en-US"/>
-          </a:p>
-        </p:txBody>
-      </p:sp>
-    </p:spTree>
-    <p:extLst>
-      <p:ext uri="{BB962C8B-B14F-4D97-AF65-F5344CB8AC3E}">
-        <p14:creationId xmlns:p14="http://schemas.microsoft.com/office/powerpoint/2010/main" val="2870062466"/>
-      </p:ext>
-    </p:extLst>
-  </p:cSld>
-  <p:clrMapOvr>
-    <a:masterClrMapping/>
-  </p:clrMapOvr>
-</p:notes>
-</file>
-
-<file path=ppt/notesSlides/notesSlide34.xml><?xml version="1.0" encoding="utf-8"?>
-<p:notes xmlns:a="http://schemas.openxmlformats.org/drawingml/2006/main" xmlns:r="http://schemas.openxmlformats.org/officeDocument/2006/relationships" xmlns:p="http://schemas.openxmlformats.org/presentationml/2006/main">
-  <p:cSld>
-    <p:spTree>
-      <p:nvGrpSpPr>
-        <p:cNvPr id="1" name=""/>
-        <p:cNvGrpSpPr/>
-        <p:nvPr/>
-      </p:nvGrpSpPr>
-      <p:grpSpPr>
-        <a:xfrm>
-          <a:off x="0" y="0"/>
-          <a:ext cx="0" cy="0"/>
-          <a:chOff x="0" y="0"/>
-          <a:chExt cx="0" cy="0"/>
-        </a:xfrm>
-      </p:grpSpPr>
-      <p:sp>
-        <p:nvSpPr>
-          <p:cNvPr id="2" name="幻灯片图像占位符 1"/>
-          <p:cNvSpPr>
-            <a:spLocks noGrp="1" noRot="1" noChangeAspect="1"/>
-          </p:cNvSpPr>
-          <p:nvPr>
-            <p:ph type="sldImg"/>
-          </p:nvPr>
-        </p:nvSpPr>
-        <p:spPr/>
-      </p:sp>
-      <p:sp>
-        <p:nvSpPr>
-          <p:cNvPr id="3" name="备注占位符 2"/>
-          <p:cNvSpPr>
-            <a:spLocks noGrp="1"/>
-          </p:cNvSpPr>
-          <p:nvPr>
-            <p:ph type="body" idx="1"/>
-          </p:nvPr>
-        </p:nvSpPr>
-        <p:spPr/>
-        <p:txBody>
-          <a:bodyPr/>
-          <a:lstStyle/>
-          <a:p>
-            <a:pPr marL="0" marR="0" lvl="0" indent="0" algn="l" defTabSz="914400" rtl="0" eaLnBrk="0" fontAlgn="base" latinLnBrk="0" hangingPunct="0">
-              <a:lnSpc>
-                <a:spcPct val="100000"/>
-              </a:lnSpc>
-              <a:spcBef>
-                <a:spcPct val="30000"/>
-              </a:spcBef>
-              <a:spcAft>
-                <a:spcPct val="0"/>
-              </a:spcAft>
-              <a:buClrTx/>
-              <a:buSzTx/>
-              <a:buFontTx/>
-              <a:buNone/>
-              <a:tabLst/>
-              <a:defRPr/>
-            </a:pPr>
-            <a:r>
-              <a:rPr lang="zh-CN" altLang="en-US" sz="1200" kern="1200" dirty="0">
-                <a:solidFill>
-                  <a:schemeClr val="tx1"/>
-                </a:solidFill>
-                <a:effectLst/>
-                <a:latin typeface="+mn-lt"/>
-                <a:ea typeface="+mn-ea"/>
-                <a:cs typeface="+mn-cs"/>
-              </a:rPr>
-              <a:t>团队协作能力、吵架能力的提升</a:t>
-            </a:r>
-            <a:endParaRPr lang="zh-CN" altLang="zh-CN" sz="1200" kern="1200" dirty="0">
-              <a:solidFill>
-                <a:schemeClr val="tx1"/>
-              </a:solidFill>
-              <a:effectLst/>
-              <a:latin typeface="+mn-lt"/>
-              <a:ea typeface="+mn-ea"/>
-              <a:cs typeface="+mn-cs"/>
-            </a:endParaRPr>
-          </a:p>
-        </p:txBody>
-      </p:sp>
-      <p:sp>
-        <p:nvSpPr>
-          <p:cNvPr id="4" name="灯片编号占位符 3"/>
-          <p:cNvSpPr>
-            <a:spLocks noGrp="1"/>
-          </p:cNvSpPr>
-          <p:nvPr>
-            <p:ph type="sldNum" sz="quarter" idx="5"/>
-          </p:nvPr>
-        </p:nvSpPr>
-        <p:spPr/>
-        <p:txBody>
-          <a:bodyPr/>
-          <a:lstStyle/>
-          <a:p>
-            <a:pPr>
-              <a:defRPr/>
-            </a:pPr>
-            <a:fld id="{DFECE1C4-3D55-403B-8670-DF732B473E43}" type="slidenum">
-              <a:rPr lang="en-US" smtClean="0"/>
-              <a:pPr>
-                <a:defRPr/>
-              </a:pPr>
-              <a:t>51</a:t>
-            </a:fld>
-            <a:endParaRPr lang="en-US"/>
-          </a:p>
-        </p:txBody>
-      </p:sp>
-    </p:spTree>
-    <p:extLst>
-      <p:ext uri="{BB962C8B-B14F-4D97-AF65-F5344CB8AC3E}">
-        <p14:creationId xmlns:p14="http://schemas.microsoft.com/office/powerpoint/2010/main" val="644760793"/>
-      </p:ext>
-    </p:extLst>
-  </p:cSld>
-  <p:clrMapOvr>
-    <a:masterClrMapping/>
-  </p:clrMapOvr>
-</p:notes>
-</file>
-
-<file path=ppt/notesSlides/notesSlide35.xml><?xml version="1.0" encoding="utf-8"?>
-<p:notes xmlns:a="http://schemas.openxmlformats.org/drawingml/2006/main" xmlns:r="http://schemas.openxmlformats.org/officeDocument/2006/relationships" xmlns:p="http://schemas.openxmlformats.org/presentationml/2006/main">
-  <p:cSld>
-    <p:spTree>
-      <p:nvGrpSpPr>
-        <p:cNvPr id="1" name=""/>
-        <p:cNvGrpSpPr/>
-        <p:nvPr/>
-      </p:nvGrpSpPr>
-      <p:grpSpPr>
-        <a:xfrm>
-          <a:off x="0" y="0"/>
-          <a:ext cx="0" cy="0"/>
-          <a:chOff x="0" y="0"/>
-          <a:chExt cx="0" cy="0"/>
-        </a:xfrm>
-      </p:grpSpPr>
-      <p:sp>
-        <p:nvSpPr>
-          <p:cNvPr id="2" name="幻灯片图像占位符 1"/>
-          <p:cNvSpPr>
-            <a:spLocks noGrp="1" noRot="1" noChangeAspect="1"/>
-          </p:cNvSpPr>
-          <p:nvPr>
-            <p:ph type="sldImg"/>
-          </p:nvPr>
-        </p:nvSpPr>
-        <p:spPr/>
-      </p:sp>
-      <p:sp>
-        <p:nvSpPr>
-          <p:cNvPr id="3" name="备注占位符 2"/>
-          <p:cNvSpPr>
-            <a:spLocks noGrp="1"/>
-          </p:cNvSpPr>
-          <p:nvPr>
-            <p:ph type="body" idx="1"/>
-          </p:nvPr>
-        </p:nvSpPr>
-        <p:spPr/>
-        <p:txBody>
-          <a:bodyPr/>
-          <a:lstStyle/>
-          <a:p>
-            <a:pPr marL="0" marR="0" lvl="0" indent="0" algn="l" defTabSz="914400" rtl="0" eaLnBrk="0" fontAlgn="base" latinLnBrk="0" hangingPunct="0">
-              <a:lnSpc>
-                <a:spcPct val="100000"/>
-              </a:lnSpc>
-              <a:spcBef>
-                <a:spcPct val="30000"/>
-              </a:spcBef>
-              <a:spcAft>
-                <a:spcPct val="0"/>
-              </a:spcAft>
-              <a:buClrTx/>
-              <a:buSzTx/>
-              <a:buFontTx/>
-              <a:buNone/>
-              <a:tabLst/>
-              <a:defRPr/>
-            </a:pPr>
-            <a:r>
-              <a:rPr lang="zh-CN" altLang="en-US" sz="1200" kern="1200" dirty="0">
-                <a:solidFill>
-                  <a:schemeClr val="tx1"/>
-                </a:solidFill>
-                <a:effectLst/>
-                <a:latin typeface="+mn-lt"/>
-                <a:ea typeface="+mn-ea"/>
-                <a:cs typeface="+mn-cs"/>
-              </a:rPr>
-              <a:t>团队协作能力、吵架能力的提升</a:t>
-            </a:r>
-            <a:endParaRPr lang="zh-CN" altLang="zh-CN" sz="1200" kern="1200" dirty="0">
-              <a:solidFill>
-                <a:schemeClr val="tx1"/>
-              </a:solidFill>
-              <a:effectLst/>
-              <a:latin typeface="+mn-lt"/>
-              <a:ea typeface="+mn-ea"/>
-              <a:cs typeface="+mn-cs"/>
-            </a:endParaRPr>
-          </a:p>
-        </p:txBody>
-      </p:sp>
-      <p:sp>
-        <p:nvSpPr>
-          <p:cNvPr id="4" name="灯片编号占位符 3"/>
-          <p:cNvSpPr>
-            <a:spLocks noGrp="1"/>
-          </p:cNvSpPr>
-          <p:nvPr>
-            <p:ph type="sldNum" sz="quarter" idx="5"/>
-          </p:nvPr>
-        </p:nvSpPr>
-        <p:spPr/>
-        <p:txBody>
-          <a:bodyPr/>
-          <a:lstStyle/>
-          <a:p>
-            <a:pPr>
-              <a:defRPr/>
-            </a:pPr>
-            <a:fld id="{DFECE1C4-3D55-403B-8670-DF732B473E43}" type="slidenum">
-              <a:rPr lang="en-US" smtClean="0"/>
-              <a:pPr>
-                <a:defRPr/>
-              </a:pPr>
-              <a:t>52</a:t>
             </a:fld>
             <a:endParaRPr lang="en-US"/>
           </a:p>
@@ -10308,7 +10065,7 @@
               <a:pPr>
                 <a:defRPr/>
               </a:pPr>
-              <a:t>1/2/19</a:t>
+              <a:t>1/3/2019</a:t>
             </a:fld>
             <a:endParaRPr lang="en-US"/>
           </a:p>
@@ -10533,7 +10290,7 @@
               <a:pPr>
                 <a:defRPr/>
               </a:pPr>
-              <a:t>1/2/19</a:t>
+              <a:t>1/3/2019</a:t>
             </a:fld>
             <a:endParaRPr lang="en-US"/>
           </a:p>
@@ -11063,7 +10820,7 @@
               <a:pPr>
                 <a:defRPr/>
               </a:pPr>
-              <a:t>1/2/19</a:t>
+              <a:t>1/3/2019</a:t>
             </a:fld>
             <a:endParaRPr lang="en-US"/>
           </a:p>
@@ -11340,7 +11097,7 @@
               <a:pPr>
                 <a:defRPr/>
               </a:pPr>
-              <a:t>1/2/19</a:t>
+              <a:t>1/3/2019</a:t>
             </a:fld>
             <a:endParaRPr lang="en-US"/>
           </a:p>
@@ -11752,7 +11509,7 @@
               <a:pPr>
                 <a:defRPr/>
               </a:pPr>
-              <a:t>1/2/19</a:t>
+              <a:t>1/3/2019</a:t>
             </a:fld>
             <a:endParaRPr lang="en-US"/>
           </a:p>
@@ -11915,7 +11672,7 @@
               <a:pPr>
                 <a:defRPr/>
               </a:pPr>
-              <a:t>1/2/19</a:t>
+              <a:t>1/3/2019</a:t>
             </a:fld>
             <a:endParaRPr lang="en-US"/>
           </a:p>
@@ -12055,7 +11812,7 @@
               <a:pPr>
                 <a:defRPr/>
               </a:pPr>
-              <a:t>1/2/19</a:t>
+              <a:t>1/3/2019</a:t>
             </a:fld>
             <a:endParaRPr lang="en-US"/>
           </a:p>
@@ -12377,7 +12134,7 @@
               <a:pPr>
                 <a:defRPr/>
               </a:pPr>
-              <a:t>1/2/19</a:t>
+              <a:t>1/3/2019</a:t>
             </a:fld>
             <a:endParaRPr lang="en-US"/>
           </a:p>
@@ -12682,7 +12439,7 @@
               <a:pPr>
                 <a:defRPr/>
               </a:pPr>
-              <a:t>1/2/19</a:t>
+              <a:t>1/3/2019</a:t>
             </a:fld>
             <a:endParaRPr lang="en-US"/>
           </a:p>
@@ -13010,7 +12767,7 @@
               <a:pPr>
                 <a:defRPr/>
               </a:pPr>
-              <a:t>1/2/19</a:t>
+              <a:t>1/3/2019</a:t>
             </a:fld>
             <a:endParaRPr lang="en-US"/>
           </a:p>
@@ -21432,7 +21189,7 @@
             </a:pPr>
             <a:r>
               <a:rPr lang="zh-CN" altLang="en-US" dirty="0"/>
-              <a:t>用户规则设计</a:t>
+              <a:t>中文适配</a:t>
             </a:r>
             <a:endParaRPr lang="en-US" altLang="zh-CN" dirty="0"/>
           </a:p>
@@ -21452,8 +21209,8 @@
         </p:nvSpPr>
         <p:spPr>
           <a:xfrm>
-            <a:off x="404812" y="933814"/>
-            <a:ext cx="7856872" cy="670440"/>
+            <a:off x="247650" y="993518"/>
+            <a:ext cx="7856872" cy="5841023"/>
           </a:xfrm>
           <a:prstGeom prst="rect">
             <a:avLst/>
@@ -21478,18 +21235,167 @@
               <a:rPr lang="zh-CN" altLang="en-US" sz="2800" dirty="0">
                 <a:latin typeface="+mj-lt"/>
               </a:rPr>
-              <a:t>泽年。。。。</a:t>
+              <a:t>分词 与 词性</a:t>
             </a:r>
             <a:endParaRPr lang="en-US" altLang="zh-CN" sz="2800" dirty="0">
               <a:latin typeface="+mj-lt"/>
             </a:endParaRPr>
           </a:p>
+          <a:p>
+            <a:pPr marL="871926" lvl="1" indent="-414726">
+              <a:lnSpc>
+                <a:spcPct val="150000"/>
+              </a:lnSpc>
+              <a:buFont typeface="Wingdings" panose="05000000000000000000" pitchFamily="2" charset="2"/>
+              <a:buChar char="Ø"/>
+              <a:defRPr/>
+            </a:pPr>
+            <a:r>
+              <a:rPr lang="zh-CN" altLang="en-US" sz="2800" dirty="0">
+                <a:latin typeface="+mj-lt"/>
+              </a:rPr>
+              <a:t>结巴分词</a:t>
+            </a:r>
+            <a:endParaRPr lang="en-US" altLang="zh-CN" sz="2800" dirty="0">
+              <a:latin typeface="+mj-lt"/>
+            </a:endParaRPr>
+          </a:p>
+          <a:p>
+            <a:pPr marL="414726" indent="-414726">
+              <a:lnSpc>
+                <a:spcPct val="150000"/>
+              </a:lnSpc>
+              <a:buFont typeface="Wingdings" panose="05000000000000000000" pitchFamily="2" charset="2"/>
+              <a:buChar char="Ø"/>
+              <a:defRPr/>
+            </a:pPr>
+            <a:r>
+              <a:rPr lang="zh-CN" altLang="en-US" sz="2800" dirty="0">
+                <a:latin typeface="+mj-lt"/>
+              </a:rPr>
+              <a:t>语法分析</a:t>
+            </a:r>
+            <a:endParaRPr lang="en-US" altLang="zh-CN" sz="2800" dirty="0">
+              <a:latin typeface="+mj-lt"/>
+            </a:endParaRPr>
+          </a:p>
+          <a:p>
+            <a:pPr marL="871926" lvl="1" indent="-414726">
+              <a:lnSpc>
+                <a:spcPct val="150000"/>
+              </a:lnSpc>
+              <a:buFont typeface="Wingdings" panose="05000000000000000000" pitchFamily="2" charset="2"/>
+              <a:buChar char="Ø"/>
+              <a:defRPr/>
+            </a:pPr>
+            <a:r>
+              <a:rPr lang="en-US" altLang="zh-CN" sz="2800" dirty="0">
+                <a:latin typeface="+mj-lt"/>
+              </a:rPr>
+              <a:t>Stanford parser for Chinese</a:t>
+            </a:r>
+          </a:p>
+          <a:p>
+            <a:pPr marL="414726" indent="-414726">
+              <a:lnSpc>
+                <a:spcPct val="150000"/>
+              </a:lnSpc>
+              <a:buFont typeface="Wingdings" panose="05000000000000000000" pitchFamily="2" charset="2"/>
+              <a:buChar char="Ø"/>
+              <a:defRPr/>
+            </a:pPr>
+            <a:r>
+              <a:rPr lang="zh-CN" altLang="en-US" sz="2800" dirty="0">
+                <a:latin typeface="+mj-lt"/>
+              </a:rPr>
+              <a:t>针对中文的默认规则的重新定义</a:t>
+            </a:r>
+            <a:endParaRPr lang="en-US" altLang="zh-CN" sz="2800" dirty="0">
+              <a:latin typeface="+mj-lt"/>
+            </a:endParaRPr>
+          </a:p>
+          <a:p>
+            <a:pPr marL="414726" indent="-414726">
+              <a:lnSpc>
+                <a:spcPct val="150000"/>
+              </a:lnSpc>
+              <a:buFont typeface="Wingdings" panose="05000000000000000000" pitchFamily="2" charset="2"/>
+              <a:buChar char="Ø"/>
+              <a:defRPr/>
+            </a:pPr>
+            <a:r>
+              <a:rPr lang="zh-CN" altLang="en-US" sz="2800" dirty="0">
+                <a:latin typeface="+mj-lt"/>
+              </a:rPr>
+              <a:t>中英文混合</a:t>
+            </a:r>
+            <a:endParaRPr lang="en-US" altLang="zh-CN" sz="2800" dirty="0">
+              <a:latin typeface="+mj-lt"/>
+            </a:endParaRPr>
+          </a:p>
+          <a:p>
+            <a:pPr marL="871926" lvl="1" indent="-414726">
+              <a:lnSpc>
+                <a:spcPct val="150000"/>
+              </a:lnSpc>
+              <a:buFont typeface="Wingdings" panose="05000000000000000000" pitchFamily="2" charset="2"/>
+              <a:buChar char="Ø"/>
+              <a:defRPr/>
+            </a:pPr>
+            <a:r>
+              <a:rPr lang="zh-CN" altLang="en-US" sz="2800" dirty="0">
+                <a:latin typeface="+mj-lt"/>
+              </a:rPr>
+              <a:t>自动识别中英文</a:t>
+            </a:r>
+            <a:endParaRPr lang="en-US" altLang="zh-CN" sz="2800" dirty="0">
+              <a:latin typeface="+mj-lt"/>
+            </a:endParaRPr>
+          </a:p>
+          <a:p>
+            <a:pPr marL="871926" lvl="1" indent="-414726">
+              <a:lnSpc>
+                <a:spcPct val="150000"/>
+              </a:lnSpc>
+              <a:buFont typeface="Wingdings" panose="05000000000000000000" pitchFamily="2" charset="2"/>
+              <a:buChar char="Ø"/>
+              <a:defRPr/>
+            </a:pPr>
+            <a:r>
+              <a:rPr lang="zh-CN" altLang="en-US" sz="2800" dirty="0">
+                <a:latin typeface="+mj-lt"/>
+              </a:rPr>
+              <a:t>允许句间的混合</a:t>
+            </a:r>
+            <a:endParaRPr lang="en-US" altLang="zh-CN" sz="2800" dirty="0">
+              <a:latin typeface="+mj-lt"/>
+            </a:endParaRPr>
+          </a:p>
+          <a:p>
+            <a:pPr marL="871926" lvl="1" indent="-414726">
+              <a:lnSpc>
+                <a:spcPct val="150000"/>
+              </a:lnSpc>
+              <a:buFont typeface="Wingdings" panose="05000000000000000000" pitchFamily="2" charset="2"/>
+              <a:buChar char="Ø"/>
+              <a:defRPr/>
+            </a:pPr>
+            <a:r>
+              <a:rPr lang="zh-CN" altLang="en-US" sz="2800" dirty="0">
+                <a:latin typeface="+mj-lt"/>
+              </a:rPr>
+              <a:t>不允许句内的混合</a:t>
+            </a:r>
+            <a:endParaRPr lang="en-US" altLang="zh-CN" sz="2800" dirty="0">
+              <a:latin typeface="+mj-lt"/>
+            </a:endParaRPr>
+          </a:p>
         </p:txBody>
       </p:sp>
     </p:spTree>
     <p:extLst>
       <p:ext uri="{BB962C8B-B14F-4D97-AF65-F5344CB8AC3E}">
-        <p14:creationId xmlns:p14="http://schemas.microsoft.com/office/powerpoint/2010/main" val="1666743941"/>
+        <p14:creationId xmlns:p14="http://schemas.microsoft.com/office/powerpoint/2010/main" val="943984934"/>
       </p:ext>
     </p:extLst>
   </p:cSld>
@@ -21519,10 +21425,10 @@
       </p:grpSpPr>
       <p:sp>
         <p:nvSpPr>
-          <p:cNvPr id="11266" name="Title 1">
+          <p:cNvPr id="6146" name="标题 1">
             <a:extLst>
               <a:ext uri="{FF2B5EF4-FFF2-40B4-BE49-F238E27FC236}">
-                <a16:creationId xmlns:a16="http://schemas.microsoft.com/office/drawing/2014/main" id="{DE2A2B24-CECA-41CB-B0DF-95AEC9A73671}"/>
+                <a16:creationId xmlns:a16="http://schemas.microsoft.com/office/drawing/2014/main" id="{373C69C6-393A-4DDE-BCF7-F046D22398D2}"/>
               </a:ext>
             </a:extLst>
           </p:cNvPr>
@@ -21535,223 +21441,130 @@
         </p:nvSpPr>
         <p:spPr>
           <a:xfrm>
-            <a:off x="247650" y="-30163"/>
-            <a:ext cx="8491538" cy="1144588"/>
+            <a:off x="628650" y="365125"/>
+            <a:ext cx="8126413" cy="1325563"/>
           </a:xfrm>
         </p:spPr>
         <p:txBody>
           <a:bodyPr/>
           <a:lstStyle/>
           <a:p>
-            <a:pPr marL="414726" indent="-414726">
-              <a:lnSpc>
-                <a:spcPct val="150000"/>
-              </a:lnSpc>
-              <a:buFont typeface="Wingdings" panose="05000000000000000000" pitchFamily="2" charset="2"/>
-              <a:buChar char="Ø"/>
-              <a:defRPr/>
-            </a:pPr>
-            <a:r>
-              <a:rPr lang="zh-CN" altLang="en-US" dirty="0"/>
-              <a:t>中文适配</a:t>
-            </a:r>
-            <a:endParaRPr lang="en-US" altLang="zh-CN" dirty="0"/>
+            <a:r>
+              <a:rPr lang="zh-CN" altLang="en-US" sz="5400" dirty="0">
+                <a:solidFill>
+                  <a:srgbClr val="1F4E79"/>
+                </a:solidFill>
+              </a:rPr>
+              <a:t>主要内容</a:t>
+            </a:r>
+            <a:r>
+              <a:rPr lang="en-US" altLang="zh-CN" sz="5400" dirty="0">
+                <a:solidFill>
+                  <a:srgbClr val="1F4E79"/>
+                </a:solidFill>
+              </a:rPr>
+              <a:t> </a:t>
+            </a:r>
           </a:p>
         </p:txBody>
       </p:sp>
       <p:sp>
         <p:nvSpPr>
-          <p:cNvPr id="5" name="文本框 4">
+          <p:cNvPr id="6147" name="内容占位符 2">
             <a:extLst>
               <a:ext uri="{FF2B5EF4-FFF2-40B4-BE49-F238E27FC236}">
-                <a16:creationId xmlns:a16="http://schemas.microsoft.com/office/drawing/2014/main" id="{913005E3-11D5-4FA9-9FD0-70631FA5F77E}"/>
+                <a16:creationId xmlns:a16="http://schemas.microsoft.com/office/drawing/2014/main" id="{C187586F-9366-4864-8671-9435528FCDF6}"/>
               </a:ext>
             </a:extLst>
           </p:cNvPr>
-          <p:cNvSpPr txBox="1"/>
-          <p:nvPr/>
+          <p:cNvSpPr>
+            <a:spLocks noGrp="1"/>
+          </p:cNvSpPr>
+          <p:nvPr>
+            <p:ph idx="1"/>
+          </p:nvPr>
         </p:nvSpPr>
         <p:spPr>
           <a:xfrm>
-            <a:off x="247650" y="993518"/>
-            <a:ext cx="7856872" cy="5841023"/>
+            <a:off x="628650" y="1825625"/>
+            <a:ext cx="8437563" cy="4351338"/>
           </a:xfrm>
-          <a:prstGeom prst="rect">
-            <a:avLst/>
-          </a:prstGeom>
-          <a:noFill/>
         </p:spPr>
         <p:txBody>
-          <a:bodyPr wrap="square">
-            <a:spAutoFit/>
-          </a:bodyPr>
+          <a:bodyPr/>
           <a:lstStyle/>
           <a:p>
-            <a:pPr marL="414726" indent="-414726">
-              <a:lnSpc>
-                <a:spcPct val="150000"/>
-              </a:lnSpc>
+            <a:pPr>
               <a:buFont typeface="Wingdings" panose="05000000000000000000" pitchFamily="2" charset="2"/>
               <a:buChar char="Ø"/>
-              <a:defRPr/>
             </a:pPr>
             <a:r>
-              <a:rPr lang="zh-CN" altLang="en-US" sz="2800" dirty="0">
-                <a:latin typeface="+mj-lt"/>
-              </a:rPr>
-              <a:t>分词 与 词性</a:t>
-            </a:r>
-            <a:endParaRPr lang="en-US" altLang="zh-CN" sz="2800" dirty="0">
-              <a:latin typeface="+mj-lt"/>
-            </a:endParaRPr>
-          </a:p>
-          <a:p>
-            <a:pPr marL="871926" lvl="1" indent="-414726">
-              <a:lnSpc>
-                <a:spcPct val="150000"/>
-              </a:lnSpc>
+              <a:rPr lang="zh-CN" altLang="en-US" b="1" dirty="0"/>
+              <a:t>项目概述</a:t>
+            </a:r>
+            <a:endParaRPr lang="en-US" altLang="zh-CN" b="1" dirty="0"/>
+          </a:p>
+          <a:p>
+            <a:pPr>
               <a:buFont typeface="Wingdings" panose="05000000000000000000" pitchFamily="2" charset="2"/>
               <a:buChar char="Ø"/>
-              <a:defRPr/>
             </a:pPr>
             <a:r>
-              <a:rPr lang="zh-CN" altLang="en-US" sz="2800" dirty="0">
-                <a:latin typeface="+mj-lt"/>
-              </a:rPr>
-              <a:t>结巴分词</a:t>
-            </a:r>
-            <a:endParaRPr lang="en-US" altLang="zh-CN" sz="2800" dirty="0">
-              <a:latin typeface="+mj-lt"/>
-            </a:endParaRPr>
-          </a:p>
-          <a:p>
-            <a:pPr marL="414726" indent="-414726">
-              <a:lnSpc>
-                <a:spcPct val="150000"/>
-              </a:lnSpc>
+              <a:rPr lang="zh-CN" altLang="en-US" b="1" dirty="0"/>
+              <a:t>需求分析</a:t>
+            </a:r>
+            <a:endParaRPr lang="en-US" altLang="zh-CN" b="1" dirty="0"/>
+          </a:p>
+          <a:p>
+            <a:pPr>
               <a:buFont typeface="Wingdings" panose="05000000000000000000" pitchFamily="2" charset="2"/>
               <a:buChar char="Ø"/>
-              <a:defRPr/>
             </a:pPr>
             <a:r>
-              <a:rPr lang="zh-CN" altLang="en-US" sz="2800" dirty="0">
-                <a:latin typeface="+mj-lt"/>
-              </a:rPr>
-              <a:t>语法分析</a:t>
-            </a:r>
-            <a:endParaRPr lang="en-US" altLang="zh-CN" sz="2800" dirty="0">
-              <a:latin typeface="+mj-lt"/>
-            </a:endParaRPr>
-          </a:p>
-          <a:p>
-            <a:pPr marL="871926" lvl="1" indent="-414726">
-              <a:lnSpc>
-                <a:spcPct val="150000"/>
-              </a:lnSpc>
+              <a:rPr lang="zh-CN" altLang="en-US" b="1" dirty="0"/>
+              <a:t>需求设计</a:t>
+            </a:r>
+            <a:endParaRPr lang="en-US" altLang="zh-CN" b="1" dirty="0"/>
+          </a:p>
+          <a:p>
+            <a:pPr>
               <a:buFont typeface="Wingdings" panose="05000000000000000000" pitchFamily="2" charset="2"/>
               <a:buChar char="Ø"/>
-              <a:defRPr/>
             </a:pPr>
             <a:r>
-              <a:rPr lang="en-US" altLang="zh-CN" sz="2800" dirty="0">
-                <a:latin typeface="+mj-lt"/>
-              </a:rPr>
-              <a:t>Stanford parser for Chinese</a:t>
-            </a:r>
-          </a:p>
-          <a:p>
-            <a:pPr marL="414726" indent="-414726">
-              <a:lnSpc>
-                <a:spcPct val="150000"/>
-              </a:lnSpc>
+              <a:rPr lang="zh-CN" altLang="en-US" b="1" dirty="0"/>
+              <a:t>代码开发</a:t>
+            </a:r>
+            <a:endParaRPr lang="en-US" altLang="zh-CN" b="1" dirty="0"/>
+          </a:p>
+          <a:p>
+            <a:pPr>
               <a:buFont typeface="Wingdings" panose="05000000000000000000" pitchFamily="2" charset="2"/>
               <a:buChar char="Ø"/>
-              <a:defRPr/>
             </a:pPr>
             <a:r>
-              <a:rPr lang="zh-CN" altLang="en-US" sz="2800" dirty="0">
-                <a:latin typeface="+mj-lt"/>
-              </a:rPr>
-              <a:t>针对中文的默认规则的重新定义</a:t>
-            </a:r>
-            <a:endParaRPr lang="en-US" altLang="zh-CN" sz="2800" dirty="0">
-              <a:latin typeface="+mj-lt"/>
-            </a:endParaRPr>
-          </a:p>
-          <a:p>
-            <a:pPr marL="414726" indent="-414726">
-              <a:lnSpc>
-                <a:spcPct val="150000"/>
-              </a:lnSpc>
+              <a:rPr lang="zh-CN" altLang="en-US" b="1" dirty="0"/>
+              <a:t>迭代测试</a:t>
+            </a:r>
+            <a:endParaRPr lang="en-US" altLang="zh-CN" b="1" dirty="0"/>
+          </a:p>
+          <a:p>
+            <a:pPr>
               <a:buFont typeface="Wingdings" panose="05000000000000000000" pitchFamily="2" charset="2"/>
               <a:buChar char="Ø"/>
-              <a:defRPr/>
             </a:pPr>
             <a:r>
-              <a:rPr lang="zh-CN" altLang="en-US" sz="2800" dirty="0">
-                <a:latin typeface="+mj-lt"/>
-              </a:rPr>
-              <a:t>中英文混合</a:t>
-            </a:r>
-            <a:endParaRPr lang="en-US" altLang="zh-CN" sz="2800" dirty="0">
-              <a:latin typeface="+mj-lt"/>
-            </a:endParaRPr>
-          </a:p>
-          <a:p>
-            <a:pPr marL="871926" lvl="1" indent="-414726">
-              <a:lnSpc>
-                <a:spcPct val="150000"/>
-              </a:lnSpc>
-              <a:buFont typeface="Wingdings" panose="05000000000000000000" pitchFamily="2" charset="2"/>
-              <a:buChar char="Ø"/>
-              <a:defRPr/>
-            </a:pPr>
-            <a:r>
-              <a:rPr lang="zh-CN" altLang="en-US" sz="2800" dirty="0">
-                <a:latin typeface="+mj-lt"/>
-              </a:rPr>
-              <a:t>自动识别中英文</a:t>
-            </a:r>
-            <a:endParaRPr lang="en-US" altLang="zh-CN" sz="2800" dirty="0">
-              <a:latin typeface="+mj-lt"/>
-            </a:endParaRPr>
-          </a:p>
-          <a:p>
-            <a:pPr marL="871926" lvl="1" indent="-414726">
-              <a:lnSpc>
-                <a:spcPct val="150000"/>
-              </a:lnSpc>
-              <a:buFont typeface="Wingdings" panose="05000000000000000000" pitchFamily="2" charset="2"/>
-              <a:buChar char="Ø"/>
-              <a:defRPr/>
-            </a:pPr>
-            <a:r>
-              <a:rPr lang="zh-CN" altLang="en-US" sz="2800" dirty="0">
-                <a:latin typeface="+mj-lt"/>
-              </a:rPr>
-              <a:t>允许句间的混合</a:t>
-            </a:r>
-            <a:endParaRPr lang="en-US" altLang="zh-CN" sz="2800" dirty="0">
-              <a:latin typeface="+mj-lt"/>
-            </a:endParaRPr>
-          </a:p>
-          <a:p>
-            <a:pPr marL="871926" lvl="1" indent="-414726">
-              <a:lnSpc>
-                <a:spcPct val="150000"/>
-              </a:lnSpc>
-              <a:buFont typeface="Wingdings" panose="05000000000000000000" pitchFamily="2" charset="2"/>
-              <a:buChar char="Ø"/>
-              <a:defRPr/>
-            </a:pPr>
-            <a:r>
-              <a:rPr lang="zh-CN" altLang="en-US" sz="2800" dirty="0">
-                <a:latin typeface="+mj-lt"/>
-              </a:rPr>
-              <a:t>不允许句内的混合</a:t>
-            </a:r>
-            <a:endParaRPr lang="en-US" altLang="zh-CN" sz="2800" dirty="0">
-              <a:latin typeface="+mj-lt"/>
+              <a:rPr lang="zh-CN" altLang="en-US" b="1" dirty="0">
+                <a:solidFill>
+                  <a:srgbClr val="0070C0"/>
+                </a:solidFill>
+              </a:rPr>
+              <a:t>项目总结</a:t>
+            </a:r>
+            <a:endParaRPr lang="en-US" altLang="zh-CN" b="1" dirty="0">
+              <a:solidFill>
+                <a:srgbClr val="0070C0"/>
+              </a:solidFill>
             </a:endParaRPr>
           </a:p>
         </p:txBody>
@@ -21759,14 +21572,13 @@
     </p:spTree>
     <p:extLst>
       <p:ext uri="{BB962C8B-B14F-4D97-AF65-F5344CB8AC3E}">
-        <p14:creationId xmlns:p14="http://schemas.microsoft.com/office/powerpoint/2010/main" val="943984934"/>
+        <p14:creationId xmlns:p14="http://schemas.microsoft.com/office/powerpoint/2010/main" val="3260559637"/>
       </p:ext>
     </p:extLst>
   </p:cSld>
   <p:clrMapOvr>
     <a:masterClrMapping/>
   </p:clrMapOvr>
-  <p:transition spd="slow"/>
 </p:sld>
 </file>
 
@@ -21789,182 +21601,6 @@
       </p:grpSpPr>
       <p:sp>
         <p:nvSpPr>
-          <p:cNvPr id="6146" name="标题 1">
-            <a:extLst>
-              <a:ext uri="{FF2B5EF4-FFF2-40B4-BE49-F238E27FC236}">
-                <a16:creationId xmlns:a16="http://schemas.microsoft.com/office/drawing/2014/main" id="{373C69C6-393A-4DDE-BCF7-F046D22398D2}"/>
-              </a:ext>
-            </a:extLst>
-          </p:cNvPr>
-          <p:cNvSpPr>
-            <a:spLocks noGrp="1"/>
-          </p:cNvSpPr>
-          <p:nvPr>
-            <p:ph type="title"/>
-          </p:nvPr>
-        </p:nvSpPr>
-        <p:spPr>
-          <a:xfrm>
-            <a:off x="628650" y="365125"/>
-            <a:ext cx="8126413" cy="1325563"/>
-          </a:xfrm>
-        </p:spPr>
-        <p:txBody>
-          <a:bodyPr/>
-          <a:lstStyle/>
-          <a:p>
-            <a:r>
-              <a:rPr lang="zh-CN" altLang="en-US" sz="5400" dirty="0">
-                <a:solidFill>
-                  <a:srgbClr val="1F4E79"/>
-                </a:solidFill>
-              </a:rPr>
-              <a:t>主要内容</a:t>
-            </a:r>
-            <a:r>
-              <a:rPr lang="en-US" altLang="zh-CN" sz="5400" dirty="0">
-                <a:solidFill>
-                  <a:srgbClr val="1F4E79"/>
-                </a:solidFill>
-              </a:rPr>
-              <a:t> </a:t>
-            </a:r>
-          </a:p>
-        </p:txBody>
-      </p:sp>
-      <p:sp>
-        <p:nvSpPr>
-          <p:cNvPr id="6147" name="内容占位符 2">
-            <a:extLst>
-              <a:ext uri="{FF2B5EF4-FFF2-40B4-BE49-F238E27FC236}">
-                <a16:creationId xmlns:a16="http://schemas.microsoft.com/office/drawing/2014/main" id="{C187586F-9366-4864-8671-9435528FCDF6}"/>
-              </a:ext>
-            </a:extLst>
-          </p:cNvPr>
-          <p:cNvSpPr>
-            <a:spLocks noGrp="1"/>
-          </p:cNvSpPr>
-          <p:nvPr>
-            <p:ph idx="1"/>
-          </p:nvPr>
-        </p:nvSpPr>
-        <p:spPr>
-          <a:xfrm>
-            <a:off x="628650" y="1825625"/>
-            <a:ext cx="8437563" cy="4351338"/>
-          </a:xfrm>
-        </p:spPr>
-        <p:txBody>
-          <a:bodyPr/>
-          <a:lstStyle/>
-          <a:p>
-            <a:pPr>
-              <a:buFont typeface="Wingdings" panose="05000000000000000000" pitchFamily="2" charset="2"/>
-              <a:buChar char="Ø"/>
-            </a:pPr>
-            <a:r>
-              <a:rPr lang="zh-CN" altLang="en-US" b="1" dirty="0"/>
-              <a:t>项目概述</a:t>
-            </a:r>
-            <a:endParaRPr lang="en-US" altLang="zh-CN" b="1" dirty="0"/>
-          </a:p>
-          <a:p>
-            <a:pPr>
-              <a:buFont typeface="Wingdings" panose="05000000000000000000" pitchFamily="2" charset="2"/>
-              <a:buChar char="Ø"/>
-            </a:pPr>
-            <a:r>
-              <a:rPr lang="zh-CN" altLang="en-US" b="1" dirty="0"/>
-              <a:t>需求分析</a:t>
-            </a:r>
-            <a:endParaRPr lang="en-US" altLang="zh-CN" b="1" dirty="0"/>
-          </a:p>
-          <a:p>
-            <a:pPr>
-              <a:buFont typeface="Wingdings" panose="05000000000000000000" pitchFamily="2" charset="2"/>
-              <a:buChar char="Ø"/>
-            </a:pPr>
-            <a:r>
-              <a:rPr lang="zh-CN" altLang="en-US" b="1" dirty="0"/>
-              <a:t>需求设计</a:t>
-            </a:r>
-            <a:endParaRPr lang="en-US" altLang="zh-CN" b="1" dirty="0"/>
-          </a:p>
-          <a:p>
-            <a:pPr>
-              <a:buFont typeface="Wingdings" panose="05000000000000000000" pitchFamily="2" charset="2"/>
-              <a:buChar char="Ø"/>
-            </a:pPr>
-            <a:r>
-              <a:rPr lang="zh-CN" altLang="en-US" b="1" dirty="0"/>
-              <a:t>代码开发</a:t>
-            </a:r>
-            <a:endParaRPr lang="en-US" altLang="zh-CN" b="1" dirty="0"/>
-          </a:p>
-          <a:p>
-            <a:pPr>
-              <a:buFont typeface="Wingdings" panose="05000000000000000000" pitchFamily="2" charset="2"/>
-              <a:buChar char="Ø"/>
-            </a:pPr>
-            <a:r>
-              <a:rPr lang="zh-CN" altLang="en-US" b="1" dirty="0"/>
-              <a:t>迭代测试</a:t>
-            </a:r>
-            <a:endParaRPr lang="en-US" altLang="zh-CN" b="1" dirty="0"/>
-          </a:p>
-          <a:p>
-            <a:pPr>
-              <a:buFont typeface="Wingdings" panose="05000000000000000000" pitchFamily="2" charset="2"/>
-              <a:buChar char="Ø"/>
-            </a:pPr>
-            <a:r>
-              <a:rPr lang="zh-CN" altLang="en-US" b="1" dirty="0">
-                <a:solidFill>
-                  <a:srgbClr val="0070C0"/>
-                </a:solidFill>
-              </a:rPr>
-              <a:t>项目总结</a:t>
-            </a:r>
-            <a:endParaRPr lang="en-US" altLang="zh-CN" b="1" dirty="0">
-              <a:solidFill>
-                <a:srgbClr val="0070C0"/>
-              </a:solidFill>
-            </a:endParaRPr>
-          </a:p>
-        </p:txBody>
-      </p:sp>
-    </p:spTree>
-    <p:extLst>
-      <p:ext uri="{BB962C8B-B14F-4D97-AF65-F5344CB8AC3E}">
-        <p14:creationId xmlns:p14="http://schemas.microsoft.com/office/powerpoint/2010/main" val="3260559637"/>
-      </p:ext>
-    </p:extLst>
-  </p:cSld>
-  <p:clrMapOvr>
-    <a:masterClrMapping/>
-  </p:clrMapOvr>
-</p:sld>
-</file>
-
-<file path=ppt/slides/slide49.xml><?xml version="1.0" encoding="utf-8"?>
-<p:sld xmlns:a="http://schemas.openxmlformats.org/drawingml/2006/main" xmlns:r="http://schemas.openxmlformats.org/officeDocument/2006/relationships" xmlns:p="http://schemas.openxmlformats.org/presentationml/2006/main">
-  <p:cSld>
-    <p:spTree>
-      <p:nvGrpSpPr>
-        <p:cNvPr id="1" name=""/>
-        <p:cNvGrpSpPr/>
-        <p:nvPr/>
-      </p:nvGrpSpPr>
-      <p:grpSpPr>
-        <a:xfrm>
-          <a:off x="0" y="0"/>
-          <a:ext cx="0" cy="0"/>
-          <a:chOff x="0" y="0"/>
-          <a:chExt cx="0" cy="0"/>
-        </a:xfrm>
-      </p:grpSpPr>
-      <p:sp>
-        <p:nvSpPr>
           <p:cNvPr id="11266" name="Title 1">
             <a:extLst>
               <a:ext uri="{FF2B5EF4-FFF2-40B4-BE49-F238E27FC236}">
@@ -22269,542 +21905,7 @@
 </p:sld>
 </file>
 
-<file path=ppt/slides/slide5.xml><?xml version="1.0" encoding="utf-8"?>
-<p:sld xmlns:a="http://schemas.openxmlformats.org/drawingml/2006/main" xmlns:r="http://schemas.openxmlformats.org/officeDocument/2006/relationships" xmlns:p="http://schemas.openxmlformats.org/presentationml/2006/main">
-  <p:cSld>
-    <p:spTree>
-      <p:nvGrpSpPr>
-        <p:cNvPr id="1" name=""/>
-        <p:cNvGrpSpPr/>
-        <p:nvPr/>
-      </p:nvGrpSpPr>
-      <p:grpSpPr>
-        <a:xfrm>
-          <a:off x="0" y="0"/>
-          <a:ext cx="0" cy="0"/>
-          <a:chOff x="0" y="0"/>
-          <a:chExt cx="0" cy="0"/>
-        </a:xfrm>
-      </p:grpSpPr>
-      <p:sp>
-        <p:nvSpPr>
-          <p:cNvPr id="11266" name="Title 1">
-            <a:extLst>
-              <a:ext uri="{FF2B5EF4-FFF2-40B4-BE49-F238E27FC236}">
-                <a16:creationId xmlns:a16="http://schemas.microsoft.com/office/drawing/2014/main" id="{DE2A2B24-CECA-41CB-B0DF-95AEC9A73671}"/>
-              </a:ext>
-            </a:extLst>
-          </p:cNvPr>
-          <p:cNvSpPr>
-            <a:spLocks noGrp="1"/>
-          </p:cNvSpPr>
-          <p:nvPr>
-            <p:ph type="title"/>
-          </p:nvPr>
-        </p:nvSpPr>
-        <p:spPr>
-          <a:xfrm>
-            <a:off x="247650" y="-30163"/>
-            <a:ext cx="8491538" cy="1144588"/>
-          </a:xfrm>
-        </p:spPr>
-        <p:txBody>
-          <a:bodyPr/>
-          <a:lstStyle/>
-          <a:p>
-            <a:r>
-              <a:rPr lang="zh-CN" altLang="en-US" dirty="0">
-                <a:solidFill>
-                  <a:srgbClr val="1F4E79"/>
-                </a:solidFill>
-              </a:rPr>
-              <a:t>项目概述</a:t>
-            </a:r>
-            <a:endParaRPr lang="en-US" altLang="zh-CN" dirty="0">
-              <a:solidFill>
-                <a:srgbClr val="1F4E79"/>
-              </a:solidFill>
-            </a:endParaRPr>
-          </a:p>
-        </p:txBody>
-      </p:sp>
-      <p:sp>
-        <p:nvSpPr>
-          <p:cNvPr id="5" name="文本框 4">
-            <a:extLst>
-              <a:ext uri="{FF2B5EF4-FFF2-40B4-BE49-F238E27FC236}">
-                <a16:creationId xmlns:a16="http://schemas.microsoft.com/office/drawing/2014/main" id="{3751AC9C-218D-4EC5-AB4D-AC78D75343F3}"/>
-              </a:ext>
-            </a:extLst>
-          </p:cNvPr>
-          <p:cNvSpPr txBox="1"/>
-          <p:nvPr/>
-        </p:nvSpPr>
-        <p:spPr>
-          <a:xfrm>
-            <a:off x="247650" y="1301750"/>
-            <a:ext cx="8491538" cy="4550989"/>
-          </a:xfrm>
-          <a:prstGeom prst="rect">
-            <a:avLst/>
-          </a:prstGeom>
-          <a:noFill/>
-        </p:spPr>
-        <p:txBody>
-          <a:bodyPr wrap="square">
-            <a:spAutoFit/>
-          </a:bodyPr>
-          <a:lstStyle/>
-          <a:p>
-            <a:pPr marL="414726" indent="-414726">
-              <a:lnSpc>
-                <a:spcPct val="150000"/>
-              </a:lnSpc>
-              <a:buFont typeface="Wingdings" panose="05000000000000000000" pitchFamily="2" charset="2"/>
-              <a:buChar char="Ø"/>
-              <a:defRPr/>
-            </a:pPr>
-            <a:r>
-              <a:rPr lang="en-US" altLang="zh-CN" sz="2800" dirty="0">
-                <a:latin typeface="+mj-lt"/>
-              </a:rPr>
-              <a:t>RUCM</a:t>
-            </a:r>
-            <a:r>
-              <a:rPr lang="zh-CN" altLang="en-US" sz="2800" dirty="0">
-                <a:latin typeface="+mj-lt"/>
-              </a:rPr>
-              <a:t>是一种结构化和模板化的需求规格，引入了流程、结构化句型和流程控制机制。</a:t>
-            </a:r>
-            <a:endParaRPr lang="en-US" altLang="zh-CN" sz="2800" dirty="0">
-              <a:latin typeface="+mj-lt"/>
-            </a:endParaRPr>
-          </a:p>
-          <a:p>
-            <a:pPr marL="414726" indent="-414726">
-              <a:lnSpc>
-                <a:spcPct val="150000"/>
-              </a:lnSpc>
-              <a:buFont typeface="Wingdings" panose="05000000000000000000" pitchFamily="2" charset="2"/>
-              <a:buChar char="Ø"/>
-              <a:defRPr/>
-            </a:pPr>
-            <a:endParaRPr lang="en-US" altLang="zh-CN" sz="2800" dirty="0">
-              <a:latin typeface="+mj-lt"/>
-            </a:endParaRPr>
-          </a:p>
-          <a:p>
-            <a:pPr marL="414726" indent="-414726">
-              <a:lnSpc>
-                <a:spcPct val="150000"/>
-              </a:lnSpc>
-              <a:buFont typeface="Wingdings" panose="05000000000000000000" pitchFamily="2" charset="2"/>
-              <a:buChar char="Ø"/>
-              <a:defRPr/>
-            </a:pPr>
-            <a:r>
-              <a:rPr lang="zh-CN" altLang="en-US" sz="2800" dirty="0">
-                <a:latin typeface="+mj-lt"/>
-              </a:rPr>
-              <a:t>本项目以</a:t>
-            </a:r>
-            <a:r>
-              <a:rPr lang="en-US" altLang="zh-CN" sz="2800" dirty="0">
-                <a:latin typeface="+mj-lt"/>
-              </a:rPr>
-              <a:t>RUCM</a:t>
-            </a:r>
-            <a:r>
-              <a:rPr lang="zh-CN" altLang="en-US" sz="2800" dirty="0">
-                <a:latin typeface="+mj-lt"/>
-              </a:rPr>
-              <a:t>编辑器产生的</a:t>
-            </a:r>
-            <a:r>
-              <a:rPr lang="en-US" altLang="zh-CN" sz="2800" dirty="0" err="1">
-                <a:latin typeface="+mj-lt"/>
-              </a:rPr>
-              <a:t>rucm</a:t>
-            </a:r>
-            <a:r>
-              <a:rPr lang="zh-CN" altLang="en-US" sz="2800" dirty="0">
-                <a:latin typeface="+mj-lt"/>
-              </a:rPr>
-              <a:t>文件作为输入，依据课堂所讲授的</a:t>
-            </a:r>
-            <a:r>
-              <a:rPr lang="en-US" altLang="zh-CN" sz="2800" dirty="0">
-                <a:latin typeface="+mj-lt"/>
-              </a:rPr>
-              <a:t>RUCM</a:t>
-            </a:r>
-            <a:r>
-              <a:rPr lang="zh-CN" altLang="en-US" sz="2800" dirty="0">
-                <a:latin typeface="+mj-lt"/>
-              </a:rPr>
-              <a:t>规范指定相应的规则，并按照规则来自动检查一个具体的需求违反了哪些规则，同时能够支持规则的设置</a:t>
-            </a:r>
-            <a:r>
-              <a:rPr lang="zh-CN" altLang="en-US" sz="2540" dirty="0">
-                <a:latin typeface="+mj-lt"/>
-              </a:rPr>
-              <a:t>。</a:t>
-            </a:r>
-            <a:endParaRPr lang="en-US" altLang="zh-CN" sz="2540" dirty="0">
-              <a:latin typeface="+mj-lt"/>
-            </a:endParaRPr>
-          </a:p>
-        </p:txBody>
-      </p:sp>
-    </p:spTree>
-  </p:cSld>
-  <p:clrMapOvr>
-    <a:masterClrMapping/>
-  </p:clrMapOvr>
-  <p:transition spd="slow"/>
-</p:sld>
-</file>
-
-<file path=ppt/slides/slide50.xml><?xml version="1.0" encoding="utf-8"?>
-<p:sld xmlns:a="http://schemas.openxmlformats.org/drawingml/2006/main" xmlns:r="http://schemas.openxmlformats.org/officeDocument/2006/relationships" xmlns:p="http://schemas.openxmlformats.org/presentationml/2006/main">
-  <p:cSld>
-    <p:spTree>
-      <p:nvGrpSpPr>
-        <p:cNvPr id="1" name=""/>
-        <p:cNvGrpSpPr/>
-        <p:nvPr/>
-      </p:nvGrpSpPr>
-      <p:grpSpPr>
-        <a:xfrm>
-          <a:off x="0" y="0"/>
-          <a:ext cx="0" cy="0"/>
-          <a:chOff x="0" y="0"/>
-          <a:chExt cx="0" cy="0"/>
-        </a:xfrm>
-      </p:grpSpPr>
-      <p:sp>
-        <p:nvSpPr>
-          <p:cNvPr id="11266" name="Title 1">
-            <a:extLst>
-              <a:ext uri="{FF2B5EF4-FFF2-40B4-BE49-F238E27FC236}">
-                <a16:creationId xmlns:a16="http://schemas.microsoft.com/office/drawing/2014/main" id="{DE2A2B24-CECA-41CB-B0DF-95AEC9A73671}"/>
-              </a:ext>
-            </a:extLst>
-          </p:cNvPr>
-          <p:cNvSpPr>
-            <a:spLocks noGrp="1"/>
-          </p:cNvSpPr>
-          <p:nvPr>
-            <p:ph type="title"/>
-          </p:nvPr>
-        </p:nvSpPr>
-        <p:spPr>
-          <a:xfrm>
-            <a:off x="247650" y="-30163"/>
-            <a:ext cx="8491538" cy="1144588"/>
-          </a:xfrm>
-        </p:spPr>
-        <p:txBody>
-          <a:bodyPr/>
-          <a:lstStyle/>
-          <a:p>
-            <a:r>
-              <a:rPr lang="zh-CN" altLang="en-US" dirty="0">
-                <a:solidFill>
-                  <a:srgbClr val="1F4E79"/>
-                </a:solidFill>
-              </a:rPr>
-              <a:t>项目总结</a:t>
-            </a:r>
-            <a:endParaRPr lang="en-US" altLang="zh-CN" dirty="0">
-              <a:solidFill>
-                <a:srgbClr val="1F4E79"/>
-              </a:solidFill>
-            </a:endParaRPr>
-          </a:p>
-        </p:txBody>
-      </p:sp>
-      <p:sp>
-        <p:nvSpPr>
-          <p:cNvPr id="5" name="文本框 4">
-            <a:extLst>
-              <a:ext uri="{FF2B5EF4-FFF2-40B4-BE49-F238E27FC236}">
-                <a16:creationId xmlns:a16="http://schemas.microsoft.com/office/drawing/2014/main" id="{1343A9A8-D792-4105-B071-94BE21B153D3}"/>
-              </a:ext>
-            </a:extLst>
-          </p:cNvPr>
-          <p:cNvSpPr txBox="1"/>
-          <p:nvPr/>
-        </p:nvSpPr>
-        <p:spPr>
-          <a:xfrm>
-            <a:off x="564982" y="831622"/>
-            <a:ext cx="8331367" cy="6478184"/>
-          </a:xfrm>
-          <a:prstGeom prst="rect">
-            <a:avLst/>
-          </a:prstGeom>
-          <a:noFill/>
-        </p:spPr>
-        <p:txBody>
-          <a:bodyPr wrap="square">
-            <a:spAutoFit/>
-          </a:bodyPr>
-          <a:lstStyle/>
-          <a:p>
-            <a:pPr marL="414726" indent="-414726">
-              <a:lnSpc>
-                <a:spcPct val="150000"/>
-              </a:lnSpc>
-              <a:buFont typeface="Wingdings" panose="05000000000000000000" pitchFamily="2" charset="2"/>
-              <a:buChar char="Ø"/>
-              <a:defRPr/>
-            </a:pPr>
-            <a:r>
-              <a:rPr lang="zh-CN" altLang="en-US" sz="2800" dirty="0">
-                <a:latin typeface="+mj-lt"/>
-              </a:rPr>
-              <a:t>基于</a:t>
-            </a:r>
-            <a:r>
-              <a:rPr lang="en-US" altLang="zh-CN" sz="2800" dirty="0">
-                <a:latin typeface="+mj-lt"/>
-              </a:rPr>
-              <a:t>GUI</a:t>
-            </a:r>
-            <a:r>
-              <a:rPr lang="zh-CN" altLang="en-US" sz="2800" dirty="0">
-                <a:latin typeface="+mj-lt"/>
-              </a:rPr>
-              <a:t>交互的</a:t>
-            </a:r>
-            <a:r>
-              <a:rPr lang="en-US" altLang="zh-CN" sz="2800" dirty="0">
-                <a:latin typeface="+mj-lt"/>
-              </a:rPr>
-              <a:t>RUCM</a:t>
-            </a:r>
-            <a:r>
-              <a:rPr lang="zh-CN" altLang="en-US" sz="2800" dirty="0">
-                <a:latin typeface="+mj-lt"/>
-              </a:rPr>
-              <a:t>合规性检查工具</a:t>
-            </a:r>
-            <a:endParaRPr lang="en-US" altLang="zh-CN" sz="2800" dirty="0">
-              <a:latin typeface="+mj-lt"/>
-            </a:endParaRPr>
-          </a:p>
-          <a:p>
-            <a:pPr marL="414726" indent="-414726">
-              <a:lnSpc>
-                <a:spcPct val="150000"/>
-              </a:lnSpc>
-              <a:buFont typeface="Wingdings" panose="05000000000000000000" pitchFamily="2" charset="2"/>
-              <a:buChar char="Ø"/>
-              <a:defRPr/>
-            </a:pPr>
-            <a:r>
-              <a:rPr lang="zh-CN" altLang="en-US" sz="2800" dirty="0">
-                <a:latin typeface="+mj-lt"/>
-              </a:rPr>
-              <a:t>主要工作</a:t>
-            </a:r>
-            <a:endParaRPr lang="en-US" altLang="zh-CN" sz="2800" dirty="0">
-              <a:latin typeface="+mj-lt"/>
-            </a:endParaRPr>
-          </a:p>
-          <a:p>
-            <a:pPr marL="871926" lvl="1" indent="-414726">
-              <a:lnSpc>
-                <a:spcPct val="150000"/>
-              </a:lnSpc>
-              <a:buFont typeface="Wingdings" panose="05000000000000000000" pitchFamily="2" charset="2"/>
-              <a:buChar char="Ø"/>
-              <a:defRPr/>
-            </a:pPr>
-            <a:r>
-              <a:rPr lang="zh-CN" altLang="en-US" sz="2000" dirty="0">
-                <a:latin typeface="+mj-lt"/>
-              </a:rPr>
-              <a:t>领域分析</a:t>
-            </a:r>
-            <a:endParaRPr lang="en-US" altLang="zh-CN" sz="2000" dirty="0">
-              <a:latin typeface="+mj-lt"/>
-            </a:endParaRPr>
-          </a:p>
-          <a:p>
-            <a:pPr marL="871926" lvl="1" indent="-414726">
-              <a:lnSpc>
-                <a:spcPct val="150000"/>
-              </a:lnSpc>
-              <a:buFont typeface="Wingdings" panose="05000000000000000000" pitchFamily="2" charset="2"/>
-              <a:buChar char="Ø"/>
-              <a:defRPr/>
-            </a:pPr>
-            <a:r>
-              <a:rPr lang="zh-CN" altLang="en-US" sz="2000" dirty="0">
-                <a:latin typeface="+mj-lt"/>
-              </a:rPr>
-              <a:t>需求分析</a:t>
-            </a:r>
-            <a:endParaRPr lang="en-US" altLang="zh-CN" sz="2000" dirty="0">
-              <a:latin typeface="+mj-lt"/>
-            </a:endParaRPr>
-          </a:p>
-          <a:p>
-            <a:pPr marL="871926" lvl="1" indent="-414726">
-              <a:lnSpc>
-                <a:spcPct val="150000"/>
-              </a:lnSpc>
-              <a:buFont typeface="Wingdings" panose="05000000000000000000" pitchFamily="2" charset="2"/>
-              <a:buChar char="Ø"/>
-              <a:defRPr/>
-            </a:pPr>
-            <a:r>
-              <a:rPr lang="zh-CN" altLang="en-US" sz="2000" dirty="0">
-                <a:latin typeface="+mj-lt"/>
-              </a:rPr>
-              <a:t>模型设计</a:t>
-            </a:r>
-            <a:endParaRPr lang="en-US" altLang="zh-CN" sz="2000" dirty="0">
-              <a:latin typeface="+mj-lt"/>
-            </a:endParaRPr>
-          </a:p>
-          <a:p>
-            <a:pPr marL="871926" lvl="1" indent="-414726">
-              <a:lnSpc>
-                <a:spcPct val="150000"/>
-              </a:lnSpc>
-              <a:buFont typeface="Wingdings" panose="05000000000000000000" pitchFamily="2" charset="2"/>
-              <a:buChar char="Ø"/>
-              <a:defRPr/>
-            </a:pPr>
-            <a:r>
-              <a:rPr lang="zh-CN" altLang="en-US" sz="2000" dirty="0">
-                <a:latin typeface="+mj-lt"/>
-              </a:rPr>
-              <a:t>代码开发</a:t>
-            </a:r>
-            <a:endParaRPr lang="en-US" altLang="zh-CN" sz="2000" dirty="0">
-              <a:latin typeface="+mj-lt"/>
-            </a:endParaRPr>
-          </a:p>
-          <a:p>
-            <a:pPr marL="871926" lvl="1" indent="-414726">
-              <a:lnSpc>
-                <a:spcPct val="150000"/>
-              </a:lnSpc>
-              <a:buFont typeface="Wingdings" panose="05000000000000000000" pitchFamily="2" charset="2"/>
-              <a:buChar char="Ø"/>
-              <a:defRPr/>
-            </a:pPr>
-            <a:r>
-              <a:rPr lang="zh-CN" altLang="en-US" sz="2000" dirty="0">
-                <a:latin typeface="+mj-lt"/>
-              </a:rPr>
-              <a:t>覆盖性测试</a:t>
-            </a:r>
-            <a:endParaRPr lang="en-US" altLang="zh-CN" sz="2000" dirty="0">
-              <a:latin typeface="+mj-lt"/>
-            </a:endParaRPr>
-          </a:p>
-          <a:p>
-            <a:pPr marL="871926" lvl="1" indent="-414726">
-              <a:lnSpc>
-                <a:spcPct val="150000"/>
-              </a:lnSpc>
-              <a:buFont typeface="Wingdings" panose="05000000000000000000" pitchFamily="2" charset="2"/>
-              <a:buChar char="Ø"/>
-              <a:defRPr/>
-            </a:pPr>
-            <a:r>
-              <a:rPr lang="zh-CN" altLang="en-US" sz="2000" dirty="0">
-                <a:latin typeface="+mj-lt"/>
-              </a:rPr>
-              <a:t>一致性验证</a:t>
-            </a:r>
-            <a:endParaRPr lang="en-US" altLang="zh-CN" sz="2000" dirty="0">
-              <a:latin typeface="+mj-lt"/>
-            </a:endParaRPr>
-          </a:p>
-          <a:p>
-            <a:pPr marL="871926" lvl="1" indent="-414726">
-              <a:lnSpc>
-                <a:spcPct val="150000"/>
-              </a:lnSpc>
-              <a:buFont typeface="Wingdings" panose="05000000000000000000" pitchFamily="2" charset="2"/>
-              <a:buChar char="Ø"/>
-              <a:defRPr/>
-            </a:pPr>
-            <a:r>
-              <a:rPr lang="en-US" altLang="zh-CN" sz="2000" dirty="0">
-                <a:latin typeface="+mj-lt"/>
-              </a:rPr>
-              <a:t>Final report</a:t>
-            </a:r>
-          </a:p>
-          <a:p>
-            <a:pPr marL="414726" indent="-414726">
-              <a:lnSpc>
-                <a:spcPct val="150000"/>
-              </a:lnSpc>
-              <a:buFont typeface="Wingdings" panose="05000000000000000000" pitchFamily="2" charset="2"/>
-              <a:buChar char="Ø"/>
-              <a:defRPr/>
-            </a:pPr>
-            <a:r>
-              <a:rPr lang="zh-CN" altLang="en-US" sz="2800" dirty="0">
-                <a:latin typeface="+mj-lt"/>
-              </a:rPr>
-              <a:t>从几十行代码到几千行代码，</a:t>
-            </a:r>
-            <a:r>
-              <a:rPr lang="zh-CN" altLang="en-US" sz="2800" b="1" dirty="0">
-                <a:solidFill>
-                  <a:srgbClr val="FF0000"/>
-                </a:solidFill>
-                <a:latin typeface="+mj-lt"/>
-              </a:rPr>
-              <a:t>团队协作能力</a:t>
-            </a:r>
-            <a:r>
-              <a:rPr lang="zh-CN" altLang="en-US" sz="2800" dirty="0">
-                <a:latin typeface="+mj-lt"/>
-              </a:rPr>
-              <a:t>的考验与提升</a:t>
-            </a:r>
-            <a:endParaRPr lang="en-US" altLang="zh-CN" sz="2800" dirty="0">
-              <a:latin typeface="+mj-lt"/>
-            </a:endParaRPr>
-          </a:p>
-          <a:p>
-            <a:pPr>
-              <a:lnSpc>
-                <a:spcPct val="150000"/>
-              </a:lnSpc>
-              <a:defRPr/>
-            </a:pPr>
-            <a:endParaRPr lang="en-US" altLang="zh-CN" sz="2800" dirty="0">
-              <a:latin typeface="+mj-lt"/>
-            </a:endParaRPr>
-          </a:p>
-        </p:txBody>
-      </p:sp>
-    </p:spTree>
-    <p:extLst>
-      <p:ext uri="{BB962C8B-B14F-4D97-AF65-F5344CB8AC3E}">
-        <p14:creationId xmlns:p14="http://schemas.microsoft.com/office/powerpoint/2010/main" val="1035074640"/>
-      </p:ext>
-    </p:extLst>
-  </p:cSld>
-  <p:clrMapOvr>
-    <a:masterClrMapping/>
-  </p:clrMapOvr>
-  <p:transition spd="slow"/>
-</p:sld>
-</file>
-
-<file path=ppt/slides/slide51.xml><?xml version="1.0" encoding="utf-8"?>
+<file path=ppt/slides/slide49.xml><?xml version="1.0" encoding="utf-8"?>
 <p:sld xmlns:a="http://schemas.openxmlformats.org/drawingml/2006/main" xmlns:r="http://schemas.openxmlformats.org/officeDocument/2006/relationships" xmlns:p="http://schemas.openxmlformats.org/presentationml/2006/main">
   <p:cSld>
     <p:spTree>
@@ -23046,7 +22147,203 @@
 </p:sld>
 </file>
 
-<file path=ppt/slides/slide52.xml><?xml version="1.0" encoding="utf-8"?>
+<file path=ppt/slides/slide5.xml><?xml version="1.0" encoding="utf-8"?>
+<p:sld xmlns:a="http://schemas.openxmlformats.org/drawingml/2006/main" xmlns:r="http://schemas.openxmlformats.org/officeDocument/2006/relationships" xmlns:p="http://schemas.openxmlformats.org/presentationml/2006/main">
+  <p:cSld>
+    <p:spTree>
+      <p:nvGrpSpPr>
+        <p:cNvPr id="1" name=""/>
+        <p:cNvGrpSpPr/>
+        <p:nvPr/>
+      </p:nvGrpSpPr>
+      <p:grpSpPr>
+        <a:xfrm>
+          <a:off x="0" y="0"/>
+          <a:ext cx="0" cy="0"/>
+          <a:chOff x="0" y="0"/>
+          <a:chExt cx="0" cy="0"/>
+        </a:xfrm>
+      </p:grpSpPr>
+      <p:sp>
+        <p:nvSpPr>
+          <p:cNvPr id="11266" name="Title 1">
+            <a:extLst>
+              <a:ext uri="{FF2B5EF4-FFF2-40B4-BE49-F238E27FC236}">
+                <a16:creationId xmlns:a16="http://schemas.microsoft.com/office/drawing/2014/main" id="{DE2A2B24-CECA-41CB-B0DF-95AEC9A73671}"/>
+              </a:ext>
+            </a:extLst>
+          </p:cNvPr>
+          <p:cNvSpPr>
+            <a:spLocks noGrp="1"/>
+          </p:cNvSpPr>
+          <p:nvPr>
+            <p:ph type="title"/>
+          </p:nvPr>
+        </p:nvSpPr>
+        <p:spPr>
+          <a:xfrm>
+            <a:off x="247650" y="-30163"/>
+            <a:ext cx="8491538" cy="1144588"/>
+          </a:xfrm>
+        </p:spPr>
+        <p:txBody>
+          <a:bodyPr/>
+          <a:lstStyle/>
+          <a:p>
+            <a:r>
+              <a:rPr lang="zh-CN" altLang="en-US" dirty="0">
+                <a:solidFill>
+                  <a:srgbClr val="1F4E79"/>
+                </a:solidFill>
+              </a:rPr>
+              <a:t>项目概述</a:t>
+            </a:r>
+            <a:endParaRPr lang="en-US" altLang="zh-CN" dirty="0">
+              <a:solidFill>
+                <a:srgbClr val="1F4E79"/>
+              </a:solidFill>
+            </a:endParaRPr>
+          </a:p>
+        </p:txBody>
+      </p:sp>
+      <p:sp>
+        <p:nvSpPr>
+          <p:cNvPr id="5" name="文本框 4">
+            <a:extLst>
+              <a:ext uri="{FF2B5EF4-FFF2-40B4-BE49-F238E27FC236}">
+                <a16:creationId xmlns:a16="http://schemas.microsoft.com/office/drawing/2014/main" id="{3751AC9C-218D-4EC5-AB4D-AC78D75343F3}"/>
+              </a:ext>
+            </a:extLst>
+          </p:cNvPr>
+          <p:cNvSpPr txBox="1"/>
+          <p:nvPr/>
+        </p:nvSpPr>
+        <p:spPr>
+          <a:xfrm>
+            <a:off x="247650" y="1301750"/>
+            <a:ext cx="8491538" cy="4550989"/>
+          </a:xfrm>
+          <a:prstGeom prst="rect">
+            <a:avLst/>
+          </a:prstGeom>
+          <a:noFill/>
+        </p:spPr>
+        <p:txBody>
+          <a:bodyPr wrap="square">
+            <a:spAutoFit/>
+          </a:bodyPr>
+          <a:lstStyle/>
+          <a:p>
+            <a:pPr marL="414726" indent="-414726">
+              <a:lnSpc>
+                <a:spcPct val="150000"/>
+              </a:lnSpc>
+              <a:buFont typeface="Wingdings" panose="05000000000000000000" pitchFamily="2" charset="2"/>
+              <a:buChar char="Ø"/>
+              <a:defRPr/>
+            </a:pPr>
+            <a:r>
+              <a:rPr lang="en-US" altLang="zh-CN" sz="2800" dirty="0">
+                <a:latin typeface="+mj-lt"/>
+              </a:rPr>
+              <a:t>RUCM</a:t>
+            </a:r>
+            <a:r>
+              <a:rPr lang="zh-CN" altLang="en-US" sz="2800" dirty="0">
+                <a:latin typeface="+mj-lt"/>
+              </a:rPr>
+              <a:t>是一种结构化和模板化的需求规格，引入了流程、结构化句型和流程控制机制。</a:t>
+            </a:r>
+            <a:endParaRPr lang="en-US" altLang="zh-CN" sz="2800" dirty="0">
+              <a:latin typeface="+mj-lt"/>
+            </a:endParaRPr>
+          </a:p>
+          <a:p>
+            <a:pPr marL="414726" indent="-414726">
+              <a:lnSpc>
+                <a:spcPct val="150000"/>
+              </a:lnSpc>
+              <a:buFont typeface="Wingdings" panose="05000000000000000000" pitchFamily="2" charset="2"/>
+              <a:buChar char="Ø"/>
+              <a:defRPr/>
+            </a:pPr>
+            <a:endParaRPr lang="en-US" altLang="zh-CN" sz="2800" dirty="0">
+              <a:latin typeface="+mj-lt"/>
+            </a:endParaRPr>
+          </a:p>
+          <a:p>
+            <a:pPr marL="414726" indent="-414726">
+              <a:lnSpc>
+                <a:spcPct val="150000"/>
+              </a:lnSpc>
+              <a:buFont typeface="Wingdings" panose="05000000000000000000" pitchFamily="2" charset="2"/>
+              <a:buChar char="Ø"/>
+              <a:defRPr/>
+            </a:pPr>
+            <a:r>
+              <a:rPr lang="zh-CN" altLang="en-US" sz="2800" dirty="0">
+                <a:latin typeface="+mj-lt"/>
+              </a:rPr>
+              <a:t>本项目以</a:t>
+            </a:r>
+            <a:r>
+              <a:rPr lang="en-US" altLang="zh-CN" sz="2800" dirty="0">
+                <a:latin typeface="+mj-lt"/>
+              </a:rPr>
+              <a:t>RUCM</a:t>
+            </a:r>
+            <a:r>
+              <a:rPr lang="zh-CN" altLang="en-US" sz="2800" dirty="0">
+                <a:latin typeface="+mj-lt"/>
+              </a:rPr>
+              <a:t>编辑器产生的</a:t>
+            </a:r>
+            <a:r>
+              <a:rPr lang="en-US" altLang="zh-CN" sz="2800" dirty="0" err="1">
+                <a:latin typeface="+mj-lt"/>
+              </a:rPr>
+              <a:t>rucm</a:t>
+            </a:r>
+            <a:r>
+              <a:rPr lang="zh-CN" altLang="en-US" sz="2800" dirty="0">
+                <a:latin typeface="+mj-lt"/>
+              </a:rPr>
+              <a:t>文件作为输入，依据课堂所讲授的</a:t>
+            </a:r>
+            <a:r>
+              <a:rPr lang="en-US" altLang="zh-CN" sz="2800" dirty="0">
+                <a:latin typeface="+mj-lt"/>
+              </a:rPr>
+              <a:t>RUCM</a:t>
+            </a:r>
+            <a:r>
+              <a:rPr lang="zh-CN" altLang="en-US" sz="2800" dirty="0">
+                <a:latin typeface="+mj-lt"/>
+              </a:rPr>
+              <a:t>规范指定相应的规则，并按照规则来自动检查一个具体的需求违反了哪些规则，同时能够支持规则的设置</a:t>
+            </a:r>
+            <a:r>
+              <a:rPr lang="zh-CN" altLang="en-US" sz="2540" dirty="0">
+                <a:latin typeface="+mj-lt"/>
+              </a:rPr>
+              <a:t>。</a:t>
+            </a:r>
+            <a:endParaRPr lang="en-US" altLang="zh-CN" sz="2540" dirty="0">
+              <a:latin typeface="+mj-lt"/>
+            </a:endParaRPr>
+          </a:p>
+        </p:txBody>
+      </p:sp>
+    </p:spTree>
+  </p:cSld>
+  <p:clrMapOvr>
+    <a:masterClrMapping/>
+  </p:clrMapOvr>
+  <p:transition spd="slow"/>
+</p:sld>
+</file>
+
+<file path=ppt/slides/slide50.xml><?xml version="1.0" encoding="utf-8"?>
 <p:sld xmlns:a="http://schemas.openxmlformats.org/drawingml/2006/main" xmlns:r="http://schemas.openxmlformats.org/officeDocument/2006/relationships" xmlns:p="http://schemas.openxmlformats.org/presentationml/2006/main">
   <p:cSld>
     <p:spTree>
@@ -23561,7 +22858,7 @@
 </p:sld>
 </file>
 
-<file path=ppt/slides/slide53.xml><?xml version="1.0" encoding="utf-8"?>
+<file path=ppt/slides/slide51.xml><?xml version="1.0" encoding="utf-8"?>
 <p:sld xmlns:a="http://schemas.openxmlformats.org/drawingml/2006/main" xmlns:r="http://schemas.openxmlformats.org/officeDocument/2006/relationships" xmlns:p="http://schemas.openxmlformats.org/presentationml/2006/main">
   <p:cSld>
     <p:spTree>
@@ -23842,7 +23139,298 @@
 </p:sld>
 </file>
 
-<file path=ppt/slides/slide54.xml><?xml version="1.0" encoding="utf-8"?>
+<file path=ppt/slides/slide52.xml><?xml version="1.0" encoding="utf-8"?>
+<p:sld xmlns:a="http://schemas.openxmlformats.org/drawingml/2006/main" xmlns:r="http://schemas.openxmlformats.org/officeDocument/2006/relationships" xmlns:p="http://schemas.openxmlformats.org/presentationml/2006/main">
+  <p:cSld>
+    <p:spTree>
+      <p:nvGrpSpPr>
+        <p:cNvPr id="1" name=""/>
+        <p:cNvGrpSpPr/>
+        <p:nvPr/>
+      </p:nvGrpSpPr>
+      <p:grpSpPr>
+        <a:xfrm>
+          <a:off x="0" y="0"/>
+          <a:ext cx="0" cy="0"/>
+          <a:chOff x="0" y="0"/>
+          <a:chExt cx="0" cy="0"/>
+        </a:xfrm>
+      </p:grpSpPr>
+      <p:sp>
+        <p:nvSpPr>
+          <p:cNvPr id="75778" name="文本框 3">
+            <a:extLst>
+              <a:ext uri="{FF2B5EF4-FFF2-40B4-BE49-F238E27FC236}">
+                <a16:creationId xmlns:a16="http://schemas.microsoft.com/office/drawing/2014/main" id="{F44A667C-EFC8-4146-B385-F8402888A1B5}"/>
+              </a:ext>
+            </a:extLst>
+          </p:cNvPr>
+          <p:cNvSpPr txBox="1">
+            <a:spLocks noChangeArrowheads="1"/>
+          </p:cNvSpPr>
+          <p:nvPr/>
+        </p:nvSpPr>
+        <p:spPr bwMode="auto">
+          <a:xfrm>
+            <a:off x="889745" y="2767280"/>
+            <a:ext cx="7364517" cy="1323439"/>
+          </a:xfrm>
+          <a:prstGeom prst="rect">
+            <a:avLst/>
+          </a:prstGeom>
+          <a:noFill/>
+          <a:ln>
+            <a:noFill/>
+          </a:ln>
+          <a:extLst>
+            <a:ext uri="{909E8E84-426E-40DD-AFC4-6F175D3DCCD1}">
+              <a14:hiddenFill xmlns:a14="http://schemas.microsoft.com/office/drawing/2010/main">
+                <a:solidFill>
+                  <a:srgbClr val="FFFFFF"/>
+                </a:solidFill>
+              </a14:hiddenFill>
+            </a:ext>
+            <a:ext uri="{91240B29-F687-4F45-9708-019B960494DF}">
+              <a14:hiddenLine xmlns:a14="http://schemas.microsoft.com/office/drawing/2010/main" w="9525">
+                <a:solidFill>
+                  <a:srgbClr val="000000"/>
+                </a:solidFill>
+                <a:miter lim="800000"/>
+                <a:headEnd/>
+                <a:tailEnd/>
+              </a14:hiddenLine>
+            </a:ext>
+          </a:extLst>
+        </p:spPr>
+        <p:txBody>
+          <a:bodyPr wrap="none">
+            <a:spAutoFit/>
+          </a:bodyPr>
+          <a:lstStyle>
+            <a:lvl1pPr>
+              <a:lnSpc>
+                <a:spcPct val="90000"/>
+              </a:lnSpc>
+              <a:spcBef>
+                <a:spcPts val="1000"/>
+              </a:spcBef>
+              <a:buFont typeface="Arial" panose="020B0604020202020204" pitchFamily="34" charset="0"/>
+              <a:buChar char="•"/>
+              <a:defRPr sz="2800">
+                <a:solidFill>
+                  <a:schemeClr val="tx1"/>
+                </a:solidFill>
+                <a:latin typeface="Times New Roman" panose="02020603050405020304" pitchFamily="18" charset="0"/>
+                <a:ea typeface="等线" panose="02010600030101010101" pitchFamily="2" charset="-122"/>
+              </a:defRPr>
+            </a:lvl1pPr>
+            <a:lvl2pPr marL="742950" indent="-285750">
+              <a:lnSpc>
+                <a:spcPct val="90000"/>
+              </a:lnSpc>
+              <a:spcBef>
+                <a:spcPts val="500"/>
+              </a:spcBef>
+              <a:buFont typeface="Arial" panose="020B0604020202020204" pitchFamily="34" charset="0"/>
+              <a:buChar char="•"/>
+              <a:defRPr sz="2400">
+                <a:solidFill>
+                  <a:schemeClr val="tx1"/>
+                </a:solidFill>
+                <a:latin typeface="Times New Roman" panose="02020603050405020304" pitchFamily="18" charset="0"/>
+                <a:ea typeface="等线" panose="02010600030101010101" pitchFamily="2" charset="-122"/>
+              </a:defRPr>
+            </a:lvl2pPr>
+            <a:lvl3pPr marL="1143000" indent="-228600">
+              <a:lnSpc>
+                <a:spcPct val="90000"/>
+              </a:lnSpc>
+              <a:spcBef>
+                <a:spcPts val="500"/>
+              </a:spcBef>
+              <a:buFont typeface="Arial" panose="020B0604020202020204" pitchFamily="34" charset="0"/>
+              <a:buChar char="•"/>
+              <a:defRPr sz="2000">
+                <a:solidFill>
+                  <a:schemeClr val="tx1"/>
+                </a:solidFill>
+                <a:latin typeface="Times New Roman" panose="02020603050405020304" pitchFamily="18" charset="0"/>
+                <a:ea typeface="等线" panose="02010600030101010101" pitchFamily="2" charset="-122"/>
+              </a:defRPr>
+            </a:lvl3pPr>
+            <a:lvl4pPr marL="1600200" indent="-228600">
+              <a:lnSpc>
+                <a:spcPct val="90000"/>
+              </a:lnSpc>
+              <a:spcBef>
+                <a:spcPts val="500"/>
+              </a:spcBef>
+              <a:buFont typeface="Arial" panose="020B0604020202020204" pitchFamily="34" charset="0"/>
+              <a:buChar char="•"/>
+              <a:defRPr>
+                <a:solidFill>
+                  <a:schemeClr val="tx1"/>
+                </a:solidFill>
+                <a:latin typeface="Times New Roman" panose="02020603050405020304" pitchFamily="18" charset="0"/>
+                <a:ea typeface="等线" panose="02010600030101010101" pitchFamily="2" charset="-122"/>
+              </a:defRPr>
+            </a:lvl4pPr>
+            <a:lvl5pPr marL="2057400" indent="-228600">
+              <a:lnSpc>
+                <a:spcPct val="90000"/>
+              </a:lnSpc>
+              <a:spcBef>
+                <a:spcPts val="500"/>
+              </a:spcBef>
+              <a:buFont typeface="Arial" panose="020B0604020202020204" pitchFamily="34" charset="0"/>
+              <a:buChar char="•"/>
+              <a:defRPr>
+                <a:solidFill>
+                  <a:schemeClr val="tx1"/>
+                </a:solidFill>
+                <a:latin typeface="Times New Roman" panose="02020603050405020304" pitchFamily="18" charset="0"/>
+                <a:ea typeface="等线" panose="02010600030101010101" pitchFamily="2" charset="-122"/>
+              </a:defRPr>
+            </a:lvl5pPr>
+            <a:lvl6pPr marL="2514600" indent="-228600" eaLnBrk="0" fontAlgn="base" hangingPunct="0">
+              <a:lnSpc>
+                <a:spcPct val="90000"/>
+              </a:lnSpc>
+              <a:spcBef>
+                <a:spcPts val="500"/>
+              </a:spcBef>
+              <a:spcAft>
+                <a:spcPct val="0"/>
+              </a:spcAft>
+              <a:buFont typeface="Arial" panose="020B0604020202020204" pitchFamily="34" charset="0"/>
+              <a:buChar char="•"/>
+              <a:defRPr>
+                <a:solidFill>
+                  <a:schemeClr val="tx1"/>
+                </a:solidFill>
+                <a:latin typeface="Times New Roman" panose="02020603050405020304" pitchFamily="18" charset="0"/>
+                <a:ea typeface="等线" panose="02010600030101010101" pitchFamily="2" charset="-122"/>
+              </a:defRPr>
+            </a:lvl6pPr>
+            <a:lvl7pPr marL="2971800" indent="-228600" eaLnBrk="0" fontAlgn="base" hangingPunct="0">
+              <a:lnSpc>
+                <a:spcPct val="90000"/>
+              </a:lnSpc>
+              <a:spcBef>
+                <a:spcPts val="500"/>
+              </a:spcBef>
+              <a:spcAft>
+                <a:spcPct val="0"/>
+              </a:spcAft>
+              <a:buFont typeface="Arial" panose="020B0604020202020204" pitchFamily="34" charset="0"/>
+              <a:buChar char="•"/>
+              <a:defRPr>
+                <a:solidFill>
+                  <a:schemeClr val="tx1"/>
+                </a:solidFill>
+                <a:latin typeface="Times New Roman" panose="02020603050405020304" pitchFamily="18" charset="0"/>
+                <a:ea typeface="等线" panose="02010600030101010101" pitchFamily="2" charset="-122"/>
+              </a:defRPr>
+            </a:lvl7pPr>
+            <a:lvl8pPr marL="3429000" indent="-228600" eaLnBrk="0" fontAlgn="base" hangingPunct="0">
+              <a:lnSpc>
+                <a:spcPct val="90000"/>
+              </a:lnSpc>
+              <a:spcBef>
+                <a:spcPts val="500"/>
+              </a:spcBef>
+              <a:spcAft>
+                <a:spcPct val="0"/>
+              </a:spcAft>
+              <a:buFont typeface="Arial" panose="020B0604020202020204" pitchFamily="34" charset="0"/>
+              <a:buChar char="•"/>
+              <a:defRPr>
+                <a:solidFill>
+                  <a:schemeClr val="tx1"/>
+                </a:solidFill>
+                <a:latin typeface="Times New Roman" panose="02020603050405020304" pitchFamily="18" charset="0"/>
+                <a:ea typeface="等线" panose="02010600030101010101" pitchFamily="2" charset="-122"/>
+              </a:defRPr>
+            </a:lvl8pPr>
+            <a:lvl9pPr marL="3886200" indent="-228600" eaLnBrk="0" fontAlgn="base" hangingPunct="0">
+              <a:lnSpc>
+                <a:spcPct val="90000"/>
+              </a:lnSpc>
+              <a:spcBef>
+                <a:spcPts val="500"/>
+              </a:spcBef>
+              <a:spcAft>
+                <a:spcPct val="0"/>
+              </a:spcAft>
+              <a:buFont typeface="Arial" panose="020B0604020202020204" pitchFamily="34" charset="0"/>
+              <a:buChar char="•"/>
+              <a:defRPr>
+                <a:solidFill>
+                  <a:schemeClr val="tx1"/>
+                </a:solidFill>
+                <a:latin typeface="Times New Roman" panose="02020603050405020304" pitchFamily="18" charset="0"/>
+                <a:ea typeface="等线" panose="02010600030101010101" pitchFamily="2" charset="-122"/>
+              </a:defRPr>
+            </a:lvl9pPr>
+          </a:lstStyle>
+          <a:p>
+            <a:pPr algn="ctr">
+              <a:lnSpc>
+                <a:spcPct val="100000"/>
+              </a:lnSpc>
+              <a:spcBef>
+                <a:spcPct val="0"/>
+              </a:spcBef>
+              <a:buFontTx/>
+              <a:buNone/>
+            </a:pPr>
+            <a:r>
+              <a:rPr lang="en-US" altLang="zh-CN" sz="8000" b="1" i="1" dirty="0">
+                <a:solidFill>
+                  <a:srgbClr val="336699"/>
+                </a:solidFill>
+              </a:rPr>
+              <a:t>Please for</a:t>
+            </a:r>
+            <a:r>
+              <a:rPr lang="zh-CN" altLang="en-US" sz="8000" b="1" i="1" dirty="0">
+                <a:solidFill>
+                  <a:srgbClr val="336699"/>
+                </a:solidFill>
+              </a:rPr>
+              <a:t> </a:t>
+            </a:r>
+            <a:r>
+              <a:rPr lang="en-US" altLang="zh-CN" sz="8000" b="1" i="1" dirty="0">
+                <a:solidFill>
+                  <a:srgbClr val="336699"/>
+                </a:solidFill>
+              </a:rPr>
+              <a:t>demo!</a:t>
+            </a:r>
+            <a:endParaRPr lang="en-US" altLang="en-US" sz="8000" b="1" i="1" dirty="0">
+              <a:solidFill>
+                <a:srgbClr val="336699"/>
+              </a:solidFill>
+            </a:endParaRPr>
+          </a:p>
+        </p:txBody>
+      </p:sp>
+    </p:spTree>
+    <p:extLst>
+      <p:ext uri="{BB962C8B-B14F-4D97-AF65-F5344CB8AC3E}">
+        <p14:creationId xmlns:p14="http://schemas.microsoft.com/office/powerpoint/2010/main" val="3522540450"/>
+      </p:ext>
+    </p:extLst>
+  </p:cSld>
+  <p:clrMapOvr>
+    <a:masterClrMapping/>
+  </p:clrMapOvr>
+  <p:transition spd="slow"/>
+</p:sld>
+</file>
+
+<file path=ppt/slides/slide53.xml><?xml version="1.0" encoding="utf-8"?>
 <p:sld xmlns:a="http://schemas.openxmlformats.org/drawingml/2006/main" xmlns:r="http://schemas.openxmlformats.org/officeDocument/2006/relationships" xmlns:p="http://schemas.openxmlformats.org/presentationml/2006/main">
   <p:cSld>
     <p:spTree>

</xml_diff>